<commit_message>
Renaming of parser in Logic Component Class Diagram
</commit_message>
<xml_diff>
--- a/docs/diagrams/NewLogicComponentClassDiagram.pptx
+++ b/docs/diagrams/NewLogicComponentClassDiagram.pptx
@@ -3935,18 +3935,13 @@
           <a:p>
             <a:pPr algn="ctr"/>
             <a:r>
-              <a:rPr lang="en-US" sz="1050" dirty="0" err="1">
+              <a:rPr lang="en-US" sz="1050" dirty="0">
                 <a:solidFill>
                   <a:schemeClr val="bg1"/>
                 </a:solidFill>
               </a:rPr>
-              <a:t>AddressBook</a:t>
-            </a:r>
-            <a:endParaRPr lang="en-US" sz="1050" dirty="0">
-              <a:solidFill>
-                <a:schemeClr val="bg1"/>
-              </a:solidFill>
-            </a:endParaRPr>
+              <a:t>Concierge</a:t>
+            </a:r>
           </a:p>
           <a:p>
             <a:pPr algn="ctr"/>

</xml_diff>